<commit_message>
fix SRS slide page num
</commit_message>
<xml_diff>
--- a/docs/Presentation/SRS.pptx
+++ b/docs/Presentation/SRS.pptx
@@ -3587,7 +3587,7 @@
           <a:p>
             <a:r>
               <a:rPr lang="en-US" dirty="0"/>
-              <a:t>8/10</a:t>
+              <a:t>9/10</a:t>
             </a:r>
           </a:p>
         </p:txBody>
@@ -4083,7 +4083,7 @@
         <p:spPr>
           <a:xfrm>
             <a:off x="10888869" y="6396382"/>
-            <a:ext cx="633507" cy="369332"/>
+            <a:ext cx="756938" cy="369332"/>
           </a:xfrm>
           <a:prstGeom prst="rect">
             <a:avLst/>
@@ -4098,7 +4098,7 @@
           <a:p>
             <a:r>
               <a:rPr lang="en-US" dirty="0"/>
-              <a:t>9/10</a:t>
+              <a:t>10/10</a:t>
             </a:r>
           </a:p>
         </p:txBody>
@@ -4658,41 +4658,6 @@
           </a:p>
         </p:txBody>
       </p:sp>
-      <p:sp>
-        <p:nvSpPr>
-          <p:cNvPr id="5" name="TextBox 4">
-            <a:extLst>
-              <a:ext uri="{FF2B5EF4-FFF2-40B4-BE49-F238E27FC236}">
-                <a16:creationId xmlns:a16="http://schemas.microsoft.com/office/drawing/2014/main" id="{96152944-1C22-B17D-2A97-ECB6F6151EC0}"/>
-              </a:ext>
-            </a:extLst>
-          </p:cNvPr>
-          <p:cNvSpPr txBox="1"/>
-          <p:nvPr/>
-        </p:nvSpPr>
-        <p:spPr>
-          <a:xfrm>
-            <a:off x="10888869" y="6396382"/>
-            <a:ext cx="756938" cy="369332"/>
-          </a:xfrm>
-          <a:prstGeom prst="rect">
-            <a:avLst/>
-          </a:prstGeom>
-          <a:noFill/>
-        </p:spPr>
-        <p:txBody>
-          <a:bodyPr wrap="none" rtlCol="0">
-            <a:spAutoFit/>
-          </a:bodyPr>
-          <a:lstStyle/>
-          <a:p>
-            <a:r>
-              <a:rPr lang="en-US" dirty="0"/>
-              <a:t>10/10</a:t>
-            </a:r>
-          </a:p>
-        </p:txBody>
-      </p:sp>
     </p:spTree>
     <p:extLst>
       <p:ext uri="{BB962C8B-B14F-4D97-AF65-F5344CB8AC3E}">
@@ -7511,8 +7476,8 @@
           </a:p>
         </p:txBody>
       </p:sp>
-      <mc:AlternateContent xmlns:mc="http://schemas.openxmlformats.org/markup-compatibility/2006">
-        <mc:Choice xmlns:a14="http://schemas.microsoft.com/office/drawing/2010/main" Requires="a14">
+      <mc:AlternateContent xmlns:mc="http://schemas.openxmlformats.org/markup-compatibility/2006" xmlns:a14="http://schemas.microsoft.com/office/drawing/2010/main">
+        <mc:Choice Requires="a14">
           <p:graphicFrame>
             <p:nvGraphicFramePr>
               <p:cNvPr id="6" name="Table 5">
@@ -9083,7 +9048,7 @@
             </a:graphic>
           </p:graphicFrame>
         </mc:Choice>
-        <mc:Fallback>
+        <mc:Fallback xmlns="">
           <p:graphicFrame>
             <p:nvGraphicFramePr>
               <p:cNvPr id="6" name="Table 5">
@@ -10354,8 +10319,8 @@
           </a:p>
         </p:txBody>
       </p:sp>
-      <mc:AlternateContent xmlns:mc="http://schemas.openxmlformats.org/markup-compatibility/2006">
-        <mc:Choice xmlns:a14="http://schemas.microsoft.com/office/drawing/2010/main" Requires="a14">
+      <mc:AlternateContent xmlns:mc="http://schemas.openxmlformats.org/markup-compatibility/2006" xmlns:a14="http://schemas.microsoft.com/office/drawing/2010/main">
+        <mc:Choice Requires="a14">
           <p:graphicFrame>
             <p:nvGraphicFramePr>
               <p:cNvPr id="3" name="Table 2">
@@ -10485,6 +10450,7 @@
                           </a:r>
                         </a:p>
                         <a:p>
+                          <a:pPr/>
                           <a14:m>
                             <m:oMathPara xmlns:m="http://schemas.openxmlformats.org/officeDocument/2006/math">
                               <m:oMathParaPr>
@@ -10938,6 +10904,7 @@
                           </a:r>
                         </a:p>
                         <a:p>
+                          <a:pPr/>
                           <a14:m>
                             <m:oMathPara xmlns:m="http://schemas.openxmlformats.org/officeDocument/2006/math">
                               <m:oMathParaPr>
@@ -11403,7 +11370,7 @@
             </a:graphic>
           </p:graphicFrame>
         </mc:Choice>
-        <mc:Fallback>
+        <mc:Fallback xmlns="">
           <p:graphicFrame>
             <p:nvGraphicFramePr>
               <p:cNvPr id="3" name="Table 2">

</xml_diff>